<commit_message>
whoops wrong files...now it's final
</commit_message>
<xml_diff>
--- a/projects/Project-2.pptx
+++ b/projects/Project-2.pptx
@@ -9,6 +9,7 @@
     <p:sldId id="258" r:id="rId3"/>
     <p:sldId id="257" r:id="rId4"/>
     <p:sldId id="259" r:id="rId5"/>
+    <p:sldId id="260" r:id="rId6"/>
   </p:sldIdLst>
   <p:sldSz cx="12192000" cy="6858000"/>
   <p:notesSz cx="6858000" cy="9144000"/>
@@ -7489,7 +7490,7 @@
         <p:spPr>
           <a:xfrm>
             <a:off x="470452" y="428178"/>
-            <a:ext cx="5155096" cy="4708981"/>
+            <a:ext cx="5155096" cy="6001643"/>
           </a:xfrm>
           <a:prstGeom prst="rect">
             <a:avLst/>
@@ -7525,21 +7526,7 @@
                 <a:latin typeface="Times New Roman" panose="02020603050405020304" pitchFamily="18" charset="0"/>
                 <a:cs typeface="Times New Roman" panose="02020603050405020304" pitchFamily="18" charset="0"/>
               </a:rPr>
-              <a:t>I want the documents asked for in </a:t>
-            </a:r>
-            <a:r>
-              <a:rPr lang="en-US" sz="2000" b="1">
-                <a:latin typeface="Times New Roman" panose="02020603050405020304" pitchFamily="18" charset="0"/>
-                <a:cs typeface="Times New Roman" panose="02020603050405020304" pitchFamily="18" charset="0"/>
-              </a:rPr>
-              <a:t>the emails. All </a:t>
-            </a:r>
-            <a:r>
-              <a:rPr lang="en-US" sz="2000" b="1" dirty="0">
-                <a:latin typeface="Times New Roman" panose="02020603050405020304" pitchFamily="18" charset="0"/>
-                <a:cs typeface="Times New Roman" panose="02020603050405020304" pitchFamily="18" charset="0"/>
-              </a:rPr>
-              <a:t>conclusions can be </a:t>
+              <a:t>I want the documents asked for in the emails. All conclusions can be </a:t>
             </a:r>
             <a:r>
               <a:rPr lang="en-US" sz="2000" b="1" i="1" dirty="0">
@@ -7557,21 +7544,84 @@
             </a:r>
           </a:p>
           <a:p>
+            <a:endParaRPr lang="en-US" sz="2000" b="1" dirty="0">
+              <a:latin typeface="Times New Roman" panose="02020603050405020304" pitchFamily="18" charset="0"/>
+              <a:cs typeface="Times New Roman" panose="02020603050405020304" pitchFamily="18" charset="0"/>
+            </a:endParaRPr>
+          </a:p>
+          <a:p>
+            <a:r>
+              <a:rPr lang="en-US" sz="1600" b="1" u="sng" dirty="0">
+                <a:latin typeface="Times New Roman" panose="02020603050405020304" pitchFamily="18" charset="0"/>
+                <a:cs typeface="Times New Roman" panose="02020603050405020304" pitchFamily="18" charset="0"/>
+              </a:rPr>
+              <a:t>Single Submission</a:t>
+            </a:r>
             <a:r>
               <a:rPr lang="en-US" sz="1600" b="1" dirty="0">
                 <a:latin typeface="Times New Roman" panose="02020603050405020304" pitchFamily="18" charset="0"/>
                 <a:cs typeface="Times New Roman" panose="02020603050405020304" pitchFamily="18" charset="0"/>
               </a:rPr>
-              <a:t>Single Submission: Recorded PowerPoint w/Slides OR Written Report Paper. </a:t>
-            </a:r>
-          </a:p>
-          <a:p>
+              <a:t>: Recorded PowerPoint w/Slides OR Written Report Paper. </a:t>
+            </a:r>
+          </a:p>
+          <a:p>
+            <a:endParaRPr lang="en-US" sz="1600" b="1" dirty="0">
+              <a:latin typeface="Times New Roman" panose="02020603050405020304" pitchFamily="18" charset="0"/>
+              <a:cs typeface="Times New Roman" panose="02020603050405020304" pitchFamily="18" charset="0"/>
+            </a:endParaRPr>
+          </a:p>
+          <a:p>
+            <a:r>
+              <a:rPr lang="en-US" sz="1600" b="1" u="sng" dirty="0">
+                <a:latin typeface="Times New Roman" panose="02020603050405020304" pitchFamily="18" charset="0"/>
+                <a:cs typeface="Times New Roman" panose="02020603050405020304" pitchFamily="18" charset="0"/>
+              </a:rPr>
+              <a:t>Group Submission</a:t>
+            </a:r>
             <a:r>
               <a:rPr lang="en-US" sz="1600" b="1" dirty="0">
                 <a:latin typeface="Times New Roman" panose="02020603050405020304" pitchFamily="18" charset="0"/>
                 <a:cs typeface="Times New Roman" panose="02020603050405020304" pitchFamily="18" charset="0"/>
               </a:rPr>
-              <a:t>Group Submission: Recorded Power Point AND Paper. </a:t>
+              <a:t>: Recorded Power Point AND Paper.</a:t>
+            </a:r>
+          </a:p>
+          <a:p>
+            <a:r>
+              <a:rPr lang="en-US" sz="1600" b="1" dirty="0">
+                <a:latin typeface="Times New Roman" panose="02020603050405020304" pitchFamily="18" charset="0"/>
+                <a:cs typeface="Times New Roman" panose="02020603050405020304" pitchFamily="18" charset="0"/>
+              </a:rPr>
+              <a:t>Your </a:t>
+            </a:r>
+            <a:r>
+              <a:rPr lang="en-US" sz="1600" b="1" u="sng" dirty="0">
+                <a:latin typeface="Times New Roman" panose="02020603050405020304" pitchFamily="18" charset="0"/>
+                <a:cs typeface="Times New Roman" panose="02020603050405020304" pitchFamily="18" charset="0"/>
+              </a:rPr>
+              <a:t>scribes</a:t>
+            </a:r>
+            <a:r>
+              <a:rPr lang="en-US" sz="1600" b="1" dirty="0">
+                <a:latin typeface="Times New Roman" panose="02020603050405020304" pitchFamily="18" charset="0"/>
+                <a:cs typeface="Times New Roman" panose="02020603050405020304" pitchFamily="18" charset="0"/>
+              </a:rPr>
+              <a:t> have an extra role as well! They have to document the project and turn in the </a:t>
+            </a:r>
+            <a:r>
+              <a:rPr lang="en-US" sz="1600" b="1" i="1" dirty="0">
+                <a:latin typeface="Times New Roman" panose="02020603050405020304" pitchFamily="18" charset="0"/>
+                <a:cs typeface="Times New Roman" panose="02020603050405020304" pitchFamily="18" charset="0"/>
+              </a:rPr>
+              <a:t>project diary</a:t>
+            </a:r>
+            <a:r>
+              <a:rPr lang="en-US" sz="1600" b="1" dirty="0">
+                <a:latin typeface="Times New Roman" panose="02020603050405020304" pitchFamily="18" charset="0"/>
+                <a:cs typeface="Times New Roman" panose="02020603050405020304" pitchFamily="18" charset="0"/>
+              </a:rPr>
+              <a:t> at the end. </a:t>
             </a:r>
           </a:p>
           <a:p>
@@ -7919,6 +7969,185 @@
     <p:extLst>
       <p:ext uri="{BB962C8B-B14F-4D97-AF65-F5344CB8AC3E}">
         <p14:creationId xmlns:p14="http://schemas.microsoft.com/office/powerpoint/2010/main" val="63134520"/>
+      </p:ext>
+    </p:extLst>
+  </p:cSld>
+  <p:clrMapOvr>
+    <a:masterClrMapping/>
+  </p:clrMapOvr>
+</p:sld>
+</file>
+
+<file path=ppt/slides/slide5.xml><?xml version="1.0" encoding="utf-8"?>
+<p:sld xmlns:a="http://schemas.openxmlformats.org/drawingml/2006/main" xmlns:r="http://schemas.openxmlformats.org/officeDocument/2006/relationships" xmlns:p="http://schemas.openxmlformats.org/presentationml/2006/main">
+  <p:cSld>
+    <p:spTree>
+      <p:nvGrpSpPr>
+        <p:cNvPr id="1" name=""/>
+        <p:cNvGrpSpPr/>
+        <p:nvPr/>
+      </p:nvGrpSpPr>
+      <p:grpSpPr>
+        <a:xfrm>
+          <a:off x="0" y="0"/>
+          <a:ext cx="0" cy="0"/>
+          <a:chOff x="0" y="0"/>
+          <a:chExt cx="0" cy="0"/>
+        </a:xfrm>
+      </p:grpSpPr>
+      <p:sp>
+        <p:nvSpPr>
+          <p:cNvPr id="2" name="Title 1">
+            <a:extLst>
+              <a:ext uri="{FF2B5EF4-FFF2-40B4-BE49-F238E27FC236}">
+                <a16:creationId xmlns:a16="http://schemas.microsoft.com/office/drawing/2014/main" id="{519C3452-D90B-49BD-8607-36E69B87BAEB}"/>
+              </a:ext>
+            </a:extLst>
+          </p:cNvPr>
+          <p:cNvSpPr>
+            <a:spLocks noGrp="1"/>
+          </p:cNvSpPr>
+          <p:nvPr>
+            <p:ph type="title"/>
+          </p:nvPr>
+        </p:nvSpPr>
+        <p:spPr>
+          <a:xfrm>
+            <a:off x="838200" y="365126"/>
+            <a:ext cx="10515600" cy="519458"/>
+          </a:xfrm>
+        </p:spPr>
+        <p:txBody>
+          <a:bodyPr>
+            <a:normAutofit fontScale="90000"/>
+          </a:bodyPr>
+          <a:lstStyle/>
+          <a:p>
+            <a:r>
+              <a:rPr lang="en-US" dirty="0"/>
+              <a:t>Group Submissions</a:t>
+            </a:r>
+          </a:p>
+        </p:txBody>
+      </p:sp>
+      <p:sp>
+        <p:nvSpPr>
+          <p:cNvPr id="3" name="Content Placeholder 2">
+            <a:extLst>
+              <a:ext uri="{FF2B5EF4-FFF2-40B4-BE49-F238E27FC236}">
+                <a16:creationId xmlns:a16="http://schemas.microsoft.com/office/drawing/2014/main" id="{7A490672-4937-4817-8415-D3D167057AFE}"/>
+              </a:ext>
+            </a:extLst>
+          </p:cNvPr>
+          <p:cNvSpPr>
+            <a:spLocks noGrp="1"/>
+          </p:cNvSpPr>
+          <p:nvPr>
+            <p:ph idx="1"/>
+          </p:nvPr>
+        </p:nvSpPr>
+        <p:spPr>
+          <a:xfrm>
+            <a:off x="838200" y="884583"/>
+            <a:ext cx="10515600" cy="5436703"/>
+          </a:xfrm>
+        </p:spPr>
+        <p:txBody>
+          <a:bodyPr>
+            <a:normAutofit lnSpcReduction="10000"/>
+          </a:bodyPr>
+          <a:lstStyle/>
+          <a:p>
+            <a:r>
+              <a:rPr lang="en-US" dirty="0"/>
+              <a:t>You can keep the same group but you have to change roles. Basically same roles but I’ll lay it out again. </a:t>
+            </a:r>
+          </a:p>
+          <a:p>
+            <a:r>
+              <a:rPr lang="en-US" dirty="0"/>
+              <a:t>Team Lead (1)</a:t>
+            </a:r>
+          </a:p>
+          <a:p>
+            <a:pPr lvl="1"/>
+            <a:r>
+              <a:rPr lang="en-US" dirty="0"/>
+              <a:t>Presents Power Point, keeps team on track, edits/proof reads any docs, thinks </a:t>
+            </a:r>
+            <a:r>
+              <a:rPr lang="en-US" i="1" dirty="0"/>
+              <a:t>big picture </a:t>
+            </a:r>
+            <a:r>
+              <a:rPr lang="en-US" dirty="0"/>
+              <a:t>doesn’t waste time with detailed calculations, lowest grade of team of poor performance.  </a:t>
+            </a:r>
+          </a:p>
+          <a:p>
+            <a:r>
+              <a:rPr lang="en-US" dirty="0"/>
+              <a:t>Technical Analysts (1-3)</a:t>
+            </a:r>
+          </a:p>
+          <a:p>
+            <a:pPr lvl="1"/>
+            <a:r>
+              <a:rPr lang="en-US" dirty="0"/>
+              <a:t>The detailed calculators, create plots for scribes, presents technical concerns to the team lead about data, </a:t>
+            </a:r>
+          </a:p>
+          <a:p>
+            <a:r>
+              <a:rPr lang="en-US" dirty="0"/>
+              <a:t>Scribes(1-3)</a:t>
+            </a:r>
+          </a:p>
+          <a:p>
+            <a:pPr lvl="1"/>
+            <a:r>
+              <a:rPr lang="en-US" dirty="0"/>
+              <a:t>Writes and compiles actual written documents to be turned in, thinks about crafting the story and not the technical details (understands them roughly from speaking and listening in meetings though), </a:t>
+            </a:r>
+            <a:r>
+              <a:rPr lang="en-US" i="1" dirty="0"/>
+              <a:t>takes notes during any meetings to compile a </a:t>
+            </a:r>
+            <a:r>
+              <a:rPr lang="en-US" i="1" u="sng" dirty="0"/>
+              <a:t>project journal </a:t>
+            </a:r>
+            <a:r>
+              <a:rPr lang="en-US" i="1" dirty="0"/>
+              <a:t>to be turned in at the end </a:t>
+            </a:r>
+            <a:r>
+              <a:rPr lang="en-US" dirty="0"/>
+              <a:t>(this is new!)</a:t>
+            </a:r>
+          </a:p>
+          <a:p>
+            <a:pPr lvl="1"/>
+            <a:endParaRPr lang="en-US" dirty="0"/>
+          </a:p>
+          <a:p>
+            <a:pPr marL="457200" lvl="1" indent="0">
+              <a:buNone/>
+            </a:pPr>
+            <a:endParaRPr lang="en-US" dirty="0"/>
+          </a:p>
+          <a:p>
+            <a:pPr marL="457200" lvl="1" indent="0">
+              <a:buNone/>
+            </a:pPr>
+            <a:endParaRPr lang="en-US" dirty="0"/>
+          </a:p>
+        </p:txBody>
+      </p:sp>
+    </p:spTree>
+    <p:extLst>
+      <p:ext uri="{BB962C8B-B14F-4D97-AF65-F5344CB8AC3E}">
+        <p14:creationId xmlns:p14="http://schemas.microsoft.com/office/powerpoint/2010/main" val="1500313324"/>
       </p:ext>
     </p:extLst>
   </p:cSld>

</xml_diff>

<commit_message>
compressible lecture summaries, minor project typos and edits
</commit_message>
<xml_diff>
--- a/projects/Project-2.pptx
+++ b/projects/Project-2.pptx
@@ -263,7 +263,7 @@
           <a:p>
             <a:fld id="{274909C0-5740-45AC-BAE0-125CCC121810}" type="datetimeFigureOut">
               <a:rPr lang="en-US" smtClean="0"/>
-              <a:t>4/30/2020</a:t>
+              <a:t>5/1/2020</a:t>
             </a:fld>
             <a:endParaRPr lang="en-US"/>
           </a:p>
@@ -461,7 +461,7 @@
           <a:p>
             <a:fld id="{274909C0-5740-45AC-BAE0-125CCC121810}" type="datetimeFigureOut">
               <a:rPr lang="en-US" smtClean="0"/>
-              <a:t>4/30/2020</a:t>
+              <a:t>5/1/2020</a:t>
             </a:fld>
             <a:endParaRPr lang="en-US"/>
           </a:p>
@@ -669,7 +669,7 @@
           <a:p>
             <a:fld id="{274909C0-5740-45AC-BAE0-125CCC121810}" type="datetimeFigureOut">
               <a:rPr lang="en-US" smtClean="0"/>
-              <a:t>4/30/2020</a:t>
+              <a:t>5/1/2020</a:t>
             </a:fld>
             <a:endParaRPr lang="en-US"/>
           </a:p>
@@ -867,7 +867,7 @@
           <a:p>
             <a:fld id="{274909C0-5740-45AC-BAE0-125CCC121810}" type="datetimeFigureOut">
               <a:rPr lang="en-US" smtClean="0"/>
-              <a:t>4/30/2020</a:t>
+              <a:t>5/1/2020</a:t>
             </a:fld>
             <a:endParaRPr lang="en-US"/>
           </a:p>
@@ -1142,7 +1142,7 @@
           <a:p>
             <a:fld id="{274909C0-5740-45AC-BAE0-125CCC121810}" type="datetimeFigureOut">
               <a:rPr lang="en-US" smtClean="0"/>
-              <a:t>4/30/2020</a:t>
+              <a:t>5/1/2020</a:t>
             </a:fld>
             <a:endParaRPr lang="en-US"/>
           </a:p>
@@ -1407,7 +1407,7 @@
           <a:p>
             <a:fld id="{274909C0-5740-45AC-BAE0-125CCC121810}" type="datetimeFigureOut">
               <a:rPr lang="en-US" smtClean="0"/>
-              <a:t>4/30/2020</a:t>
+              <a:t>5/1/2020</a:t>
             </a:fld>
             <a:endParaRPr lang="en-US"/>
           </a:p>
@@ -1819,7 +1819,7 @@
           <a:p>
             <a:fld id="{274909C0-5740-45AC-BAE0-125CCC121810}" type="datetimeFigureOut">
               <a:rPr lang="en-US" smtClean="0"/>
-              <a:t>4/30/2020</a:t>
+              <a:t>5/1/2020</a:t>
             </a:fld>
             <a:endParaRPr lang="en-US"/>
           </a:p>
@@ -1960,7 +1960,7 @@
           <a:p>
             <a:fld id="{274909C0-5740-45AC-BAE0-125CCC121810}" type="datetimeFigureOut">
               <a:rPr lang="en-US" smtClean="0"/>
-              <a:t>4/30/2020</a:t>
+              <a:t>5/1/2020</a:t>
             </a:fld>
             <a:endParaRPr lang="en-US"/>
           </a:p>
@@ -2073,7 +2073,7 @@
           <a:p>
             <a:fld id="{274909C0-5740-45AC-BAE0-125CCC121810}" type="datetimeFigureOut">
               <a:rPr lang="en-US" smtClean="0"/>
-              <a:t>4/30/2020</a:t>
+              <a:t>5/1/2020</a:t>
             </a:fld>
             <a:endParaRPr lang="en-US"/>
           </a:p>
@@ -2384,7 +2384,7 @@
           <a:p>
             <a:fld id="{274909C0-5740-45AC-BAE0-125CCC121810}" type="datetimeFigureOut">
               <a:rPr lang="en-US" smtClean="0"/>
-              <a:t>4/30/2020</a:t>
+              <a:t>5/1/2020</a:t>
             </a:fld>
             <a:endParaRPr lang="en-US"/>
           </a:p>
@@ -2672,7 +2672,7 @@
           <a:p>
             <a:fld id="{274909C0-5740-45AC-BAE0-125CCC121810}" type="datetimeFigureOut">
               <a:rPr lang="en-US" smtClean="0"/>
-              <a:t>4/30/2020</a:t>
+              <a:t>5/1/2020</a:t>
             </a:fld>
             <a:endParaRPr lang="en-US"/>
           </a:p>
@@ -2913,7 +2913,7 @@
           <a:p>
             <a:fld id="{274909C0-5740-45AC-BAE0-125CCC121810}" type="datetimeFigureOut">
               <a:rPr lang="en-US" smtClean="0"/>
-              <a:t>4/30/2020</a:t>
+              <a:t>5/1/2020</a:t>
             </a:fld>
             <a:endParaRPr lang="en-US"/>
           </a:p>
@@ -7292,8 +7292,8 @@
         </p:nvSpPr>
         <p:spPr>
           <a:xfrm>
-            <a:off x="530088" y="583786"/>
-            <a:ext cx="6569766" cy="6063198"/>
+            <a:off x="530088" y="289679"/>
+            <a:ext cx="6569766" cy="6278642"/>
           </a:xfrm>
           <a:prstGeom prst="rect">
             <a:avLst/>
@@ -7387,7 +7387,7 @@
                 <a:latin typeface="Times New Roman" panose="02020603050405020304" pitchFamily="18" charset="0"/>
                 <a:cs typeface="Times New Roman" panose="02020603050405020304" pitchFamily="18" charset="0"/>
               </a:rPr>
-              <a:t>	A former marine and a hell of an engineer. He cut his teeth in the air-force as  	a flight mechanic for apache helicopters before college and then work. He 	thinks out of the box and has come up with a series of notes describing a 	new method of pump selection given combustion data. </a:t>
+              <a:t>	A former marine and a hell of an engineer. He cut his teeth in the air-force as  	a flight mechanic for apache helicopters before college and then work. He 	thinks out of the box and has come up with several innovative design 	methods the company has profited off of. </a:t>
             </a:r>
           </a:p>
           <a:p>
@@ -7425,7 +7425,7 @@
                 <a:latin typeface="Times New Roman" panose="02020603050405020304" pitchFamily="18" charset="0"/>
                 <a:cs typeface="Times New Roman" panose="02020603050405020304" pitchFamily="18" charset="0"/>
               </a:rPr>
-              <a:t> at Stanford, not the most vocal 	engineer. He has developed fuel additives that have increased yields twice in 	his career. He is a great resource for properties of the fuel and measurement 	methods.</a:t>
+              <a:t> at Stanford, not the most vocal 	engineer. He has developed fuel additives that have increased yields twice in 	his career. He is a great resource for properties of the fuel and measurement 	methods. He always delivers data with a warning header saying “Quantify 	Error When In Use.”</a:t>
             </a:r>
           </a:p>
           <a:p>
@@ -8094,7 +8094,7 @@
             <a:pPr lvl="1"/>
             <a:r>
               <a:rPr lang="en-US" dirty="0"/>
-              <a:t>The detailed calculators, create plots for scribes, presents technical concerns to the team lead about data, </a:t>
+              <a:t>The detailed calculators, create plots for scribes, presents technical concerns to the team lead about data.</a:t>
             </a:r>
           </a:p>
           <a:p>

</xml_diff>